<commit_message>
Update slide buoi 2
</commit_message>
<xml_diff>
--- a/Slide/Seminar2.pptx
+++ b/Slide/Seminar2.pptx
@@ -15,9 +15,11 @@
     <p:sldId id="259" r:id="rId9"/>
     <p:sldId id="260" r:id="rId10"/>
     <p:sldId id="261" r:id="rId11"/>
-    <p:sldId id="262" r:id="rId12"/>
-    <p:sldId id="263" r:id="rId13"/>
-    <p:sldId id="264" r:id="rId14"/>
+    <p:sldId id="265" r:id="rId12"/>
+    <p:sldId id="262" r:id="rId13"/>
+    <p:sldId id="266" r:id="rId14"/>
+    <p:sldId id="263" r:id="rId15"/>
+    <p:sldId id="264" r:id="rId16"/>
   </p:sldIdLst>
   <p:sldSz cx="9144000" cy="6858000" type="screen4x3"/>
   <p:notesSz cx="7559675" cy="10691813"/>
@@ -116,6 +118,11 @@
       </a:defRPr>
     </a:lvl9pPr>
   </p:defaultTextStyle>
+  <p:extLst>
+    <p:ext uri="{EFAFB233-063F-42B5-8137-9DF3F51BA10A}">
+      <p15:sldGuideLst xmlns:p15="http://schemas.microsoft.com/office/powerpoint/2012/main"/>
+    </p:ext>
+  </p:extLst>
 </p:presentation>
 </file>
 
@@ -10824,6 +10831,789 @@
 </p:sld>
 </file>
 
+<file path=ppt/slides/slide10.xml><?xml version="1.0" encoding="utf-8"?>
+<p:sld xmlns:a="http://schemas.openxmlformats.org/drawingml/2006/main" xmlns:r="http://schemas.openxmlformats.org/officeDocument/2006/relationships" xmlns:p="http://schemas.openxmlformats.org/presentationml/2006/main">
+  <p:cSld>
+    <p:spTree>
+      <p:nvGrpSpPr>
+        <p:cNvPr id="1" name=""/>
+        <p:cNvGrpSpPr/>
+        <p:nvPr/>
+      </p:nvGrpSpPr>
+      <p:grpSpPr>
+        <a:xfrm>
+          <a:off x="0" y="0"/>
+          <a:ext cx="0" cy="0"/>
+          <a:chOff x="0" y="0"/>
+          <a:chExt cx="0" cy="0"/>
+        </a:xfrm>
+      </p:grpSpPr>
+      <p:sp>
+        <p:nvSpPr>
+          <p:cNvPr id="222" name="CustomShape 1"/>
+          <p:cNvSpPr/>
+          <p:nvPr/>
+        </p:nvSpPr>
+        <p:spPr>
+          <a:xfrm>
+            <a:off x="457200" y="413640"/>
+            <a:ext cx="8228160" cy="709560"/>
+          </a:xfrm>
+          <a:prstGeom prst="rect">
+            <a:avLst/>
+          </a:prstGeom>
+          <a:noFill/>
+          <a:ln>
+            <a:noFill/>
+          </a:ln>
+        </p:spPr>
+        <p:style>
+          <a:lnRef idx="0">
+            <a:scrgbClr r="0" g="0" b="0"/>
+          </a:lnRef>
+          <a:fillRef idx="0">
+            <a:scrgbClr r="0" g="0" b="0"/>
+          </a:fillRef>
+          <a:effectRef idx="0">
+            <a:scrgbClr r="0" g="0" b="0"/>
+          </a:effectRef>
+          <a:fontRef idx="minor"/>
+        </p:style>
+        <p:txBody>
+          <a:bodyPr lIns="122040" tIns="60840" rIns="122040" bIns="60840" anchor="ctr"/>
+          <a:lstStyle/>
+          <a:p>
+            <a:r>
+              <a:rPr lang="en-US" sz="3200" b="1" strike="noStrike" spc="-1">
+                <a:solidFill>
+                  <a:srgbClr val="FFFFFF"/>
+                </a:solidFill>
+                <a:uFill>
+                  <a:solidFill>
+                    <a:srgbClr val="FFFFFF"/>
+                  </a:solidFill>
+                </a:uFill>
+                <a:latin typeface="Calibri"/>
+                <a:ea typeface="DejaVu Sans"/>
+              </a:rPr>
+              <a:t>Problems</a:t>
+            </a:r>
+            <a:endParaRPr lang="en-US" sz="1800" b="0" strike="noStrike" spc="-1">
+              <a:solidFill>
+                <a:srgbClr val="B2B2B2"/>
+              </a:solidFill>
+              <a:uFill>
+                <a:solidFill>
+                  <a:srgbClr val="FFFFFF"/>
+                </a:solidFill>
+              </a:uFill>
+              <a:latin typeface="Arial"/>
+            </a:endParaRPr>
+          </a:p>
+        </p:txBody>
+      </p:sp>
+      <p:sp>
+        <p:nvSpPr>
+          <p:cNvPr id="223" name="CustomShape 2"/>
+          <p:cNvSpPr/>
+          <p:nvPr/>
+        </p:nvSpPr>
+        <p:spPr>
+          <a:xfrm>
+            <a:off x="457200" y="1554480"/>
+            <a:ext cx="2467800" cy="458280"/>
+          </a:xfrm>
+          <a:prstGeom prst="rect">
+            <a:avLst/>
+          </a:prstGeom>
+          <a:noFill/>
+          <a:ln>
+            <a:noFill/>
+          </a:ln>
+        </p:spPr>
+        <p:style>
+          <a:lnRef idx="0">
+            <a:scrgbClr r="0" g="0" b="0"/>
+          </a:lnRef>
+          <a:fillRef idx="0">
+            <a:scrgbClr r="0" g="0" b="0"/>
+          </a:fillRef>
+          <a:effectRef idx="0">
+            <a:scrgbClr r="0" g="0" b="0"/>
+          </a:effectRef>
+          <a:fontRef idx="minor"/>
+        </p:style>
+        <p:txBody>
+          <a:bodyPr lIns="90000" tIns="45000" rIns="90000" bIns="45000"/>
+          <a:lstStyle/>
+          <a:p>
+            <a:pPr algn="just">
+              <a:lnSpc>
+                <a:spcPct val="100000"/>
+              </a:lnSpc>
+            </a:pPr>
+            <a:r>
+              <a:rPr lang="en-US" sz="2600" b="1" strike="noStrike" spc="-1">
+                <a:solidFill>
+                  <a:srgbClr val="B2B2B2"/>
+                </a:solidFill>
+                <a:uFill>
+                  <a:solidFill>
+                    <a:srgbClr val="FFFFFF"/>
+                  </a:solidFill>
+                </a:uFill>
+                <a:latin typeface="Arial"/>
+                <a:ea typeface="DejaVu Sans"/>
+              </a:rPr>
+              <a:t>Khó Khăn:</a:t>
+            </a:r>
+            <a:endParaRPr lang="en-US" sz="1800" b="0" strike="noStrike" spc="-1">
+              <a:solidFill>
+                <a:srgbClr val="B2B2B2"/>
+              </a:solidFill>
+              <a:uFill>
+                <a:solidFill>
+                  <a:srgbClr val="FFFFFF"/>
+                </a:solidFill>
+              </a:uFill>
+              <a:latin typeface="Arial"/>
+            </a:endParaRPr>
+          </a:p>
+        </p:txBody>
+      </p:sp>
+      <p:sp>
+        <p:nvSpPr>
+          <p:cNvPr id="224" name="CustomShape 3"/>
+          <p:cNvSpPr/>
+          <p:nvPr/>
+        </p:nvSpPr>
+        <p:spPr>
+          <a:xfrm>
+            <a:off x="4846320" y="1554480"/>
+            <a:ext cx="3473640" cy="827280"/>
+          </a:xfrm>
+          <a:prstGeom prst="rect">
+            <a:avLst/>
+          </a:prstGeom>
+          <a:noFill/>
+          <a:ln>
+            <a:noFill/>
+          </a:ln>
+        </p:spPr>
+        <p:style>
+          <a:lnRef idx="0">
+            <a:scrgbClr r="0" g="0" b="0"/>
+          </a:lnRef>
+          <a:fillRef idx="0">
+            <a:scrgbClr r="0" g="0" b="0"/>
+          </a:fillRef>
+          <a:effectRef idx="0">
+            <a:scrgbClr r="0" g="0" b="0"/>
+          </a:effectRef>
+          <a:fontRef idx="minor"/>
+        </p:style>
+        <p:txBody>
+          <a:bodyPr lIns="90000" tIns="45000" rIns="90000" bIns="45000"/>
+          <a:lstStyle/>
+          <a:p>
+            <a:r>
+              <a:rPr lang="en-US" sz="2600" b="1" strike="noStrike" spc="-1">
+                <a:solidFill>
+                  <a:srgbClr val="CCCCCC"/>
+                </a:solidFill>
+                <a:uFill>
+                  <a:solidFill>
+                    <a:srgbClr val="FFFFFF"/>
+                  </a:solidFill>
+                </a:uFill>
+                <a:latin typeface="Arial"/>
+                <a:ea typeface="DejaVu Sans"/>
+              </a:rPr>
+              <a:t>Hướng giải quyết:</a:t>
+            </a:r>
+            <a:endParaRPr lang="en-US" sz="1800" b="0" strike="noStrike" spc="-1">
+              <a:solidFill>
+                <a:srgbClr val="CCCCCC"/>
+              </a:solidFill>
+              <a:uFill>
+                <a:solidFill>
+                  <a:srgbClr val="FFFFFF"/>
+                </a:solidFill>
+              </a:uFill>
+              <a:latin typeface="Arial"/>
+            </a:endParaRPr>
+          </a:p>
+        </p:txBody>
+      </p:sp>
+      <p:sp>
+        <p:nvSpPr>
+          <p:cNvPr id="225" name="Line 4"/>
+          <p:cNvSpPr/>
+          <p:nvPr/>
+        </p:nvSpPr>
+        <p:spPr>
+          <a:xfrm>
+            <a:off x="4114800" y="1645920"/>
+            <a:ext cx="91440" cy="3931920"/>
+          </a:xfrm>
+          <a:prstGeom prst="line">
+            <a:avLst/>
+          </a:prstGeom>
+          <a:ln>
+            <a:solidFill>
+              <a:srgbClr val="000000"/>
+            </a:solidFill>
+          </a:ln>
+        </p:spPr>
+        <p:style>
+          <a:lnRef idx="0">
+            <a:scrgbClr r="0" g="0" b="0"/>
+          </a:lnRef>
+          <a:fillRef idx="0">
+            <a:scrgbClr r="0" g="0" b="0"/>
+          </a:fillRef>
+          <a:effectRef idx="0">
+            <a:scrgbClr r="0" g="0" b="0"/>
+          </a:effectRef>
+          <a:fontRef idx="minor"/>
+        </p:style>
+      </p:sp>
+      <p:sp>
+        <p:nvSpPr>
+          <p:cNvPr id="226" name="CustomShape 5"/>
+          <p:cNvSpPr/>
+          <p:nvPr/>
+        </p:nvSpPr>
+        <p:spPr>
+          <a:xfrm>
+            <a:off x="548640" y="2194560"/>
+            <a:ext cx="3107880" cy="2808000"/>
+          </a:xfrm>
+          <a:prstGeom prst="rect">
+            <a:avLst/>
+          </a:prstGeom>
+          <a:noFill/>
+          <a:ln>
+            <a:noFill/>
+          </a:ln>
+        </p:spPr>
+        <p:style>
+          <a:lnRef idx="0">
+            <a:scrgbClr r="0" g="0" b="0"/>
+          </a:lnRef>
+          <a:fillRef idx="0">
+            <a:scrgbClr r="0" g="0" b="0"/>
+          </a:fillRef>
+          <a:effectRef idx="0">
+            <a:scrgbClr r="0" g="0" b="0"/>
+          </a:effectRef>
+          <a:fontRef idx="minor"/>
+        </p:style>
+        <p:txBody>
+          <a:bodyPr lIns="90000" tIns="45000" rIns="90000" bIns="45000"/>
+          <a:lstStyle/>
+          <a:p>
+            <a:r>
+              <a:rPr lang="en-US" sz="2400" b="0" strike="noStrike" spc="-1">
+                <a:solidFill>
+                  <a:srgbClr val="DDDDDD"/>
+                </a:solidFill>
+                <a:uFill>
+                  <a:solidFill>
+                    <a:srgbClr val="FFFFFF"/>
+                  </a:solidFill>
+                </a:uFill>
+                <a:latin typeface="Arial"/>
+                <a:ea typeface="DejaVu Sans"/>
+              </a:rPr>
+              <a:t>- Thuật toán: chưa crawl đầy đử dữ liệu, vẫn chưa lọc đc những dữ liệu cần thiết </a:t>
+            </a:r>
+            <a:endParaRPr lang="en-US" sz="1800" b="0" strike="noStrike" spc="-1">
+              <a:solidFill>
+                <a:srgbClr val="DDDDDD"/>
+              </a:solidFill>
+              <a:uFill>
+                <a:solidFill>
+                  <a:srgbClr val="FFFFFF"/>
+                </a:solidFill>
+              </a:uFill>
+              <a:latin typeface="Arial"/>
+            </a:endParaRPr>
+          </a:p>
+          <a:p>
+            <a:endParaRPr lang="en-US" sz="1800" b="0" strike="noStrike" spc="-1">
+              <a:solidFill>
+                <a:srgbClr val="DDDDDD"/>
+              </a:solidFill>
+              <a:uFill>
+                <a:solidFill>
+                  <a:srgbClr val="FFFFFF"/>
+                </a:solidFill>
+              </a:uFill>
+              <a:latin typeface="Arial"/>
+            </a:endParaRPr>
+          </a:p>
+          <a:p>
+            <a:endParaRPr lang="en-US" sz="1800" b="0" strike="noStrike" spc="-1">
+              <a:solidFill>
+                <a:srgbClr val="DDDDDD"/>
+              </a:solidFill>
+              <a:uFill>
+                <a:solidFill>
+                  <a:srgbClr val="FFFFFF"/>
+                </a:solidFill>
+              </a:uFill>
+              <a:latin typeface="Arial"/>
+            </a:endParaRPr>
+          </a:p>
+          <a:p>
+            <a:endParaRPr lang="en-US" sz="1800" b="0" strike="noStrike" spc="-1">
+              <a:solidFill>
+                <a:srgbClr val="DDDDDD"/>
+              </a:solidFill>
+              <a:uFill>
+                <a:solidFill>
+                  <a:srgbClr val="FFFFFF"/>
+                </a:solidFill>
+              </a:uFill>
+              <a:latin typeface="Arial"/>
+            </a:endParaRPr>
+          </a:p>
+          <a:p>
+            <a:endParaRPr lang="en-US" sz="1800" b="0" strike="noStrike" spc="-1">
+              <a:solidFill>
+                <a:srgbClr val="DDDDDD"/>
+              </a:solidFill>
+              <a:uFill>
+                <a:solidFill>
+                  <a:srgbClr val="FFFFFF"/>
+                </a:solidFill>
+              </a:uFill>
+              <a:latin typeface="Arial"/>
+            </a:endParaRPr>
+          </a:p>
+          <a:p>
+            <a:endParaRPr lang="en-US" sz="1800" b="0" strike="noStrike" spc="-1">
+              <a:solidFill>
+                <a:srgbClr val="DDDDDD"/>
+              </a:solidFill>
+              <a:uFill>
+                <a:solidFill>
+                  <a:srgbClr val="FFFFFF"/>
+                </a:solidFill>
+              </a:uFill>
+              <a:latin typeface="Arial"/>
+            </a:endParaRPr>
+          </a:p>
+          <a:p>
+            <a:endParaRPr lang="en-US" sz="1800" b="0" strike="noStrike" spc="-1">
+              <a:solidFill>
+                <a:srgbClr val="DDDDDD"/>
+              </a:solidFill>
+              <a:uFill>
+                <a:solidFill>
+                  <a:srgbClr val="FFFFFF"/>
+                </a:solidFill>
+              </a:uFill>
+              <a:latin typeface="Arial"/>
+            </a:endParaRPr>
+          </a:p>
+          <a:p>
+            <a:endParaRPr lang="en-US" sz="1800" b="0" strike="noStrike" spc="-1">
+              <a:solidFill>
+                <a:srgbClr val="DDDDDD"/>
+              </a:solidFill>
+              <a:uFill>
+                <a:solidFill>
+                  <a:srgbClr val="FFFFFF"/>
+                </a:solidFill>
+              </a:uFill>
+              <a:latin typeface="Arial"/>
+            </a:endParaRPr>
+          </a:p>
+        </p:txBody>
+      </p:sp>
+      <p:sp>
+        <p:nvSpPr>
+          <p:cNvPr id="227" name="CustomShape 6"/>
+          <p:cNvSpPr/>
+          <p:nvPr/>
+        </p:nvSpPr>
+        <p:spPr>
+          <a:xfrm>
+            <a:off x="4297680" y="2091240"/>
+            <a:ext cx="3382200" cy="1565280"/>
+          </a:xfrm>
+          <a:prstGeom prst="rect">
+            <a:avLst/>
+          </a:prstGeom>
+          <a:noFill/>
+          <a:ln>
+            <a:noFill/>
+          </a:ln>
+        </p:spPr>
+        <p:style>
+          <a:lnRef idx="0">
+            <a:scrgbClr r="0" g="0" b="0"/>
+          </a:lnRef>
+          <a:fillRef idx="0">
+            <a:scrgbClr r="0" g="0" b="0"/>
+          </a:fillRef>
+          <a:effectRef idx="0">
+            <a:scrgbClr r="0" g="0" b="0"/>
+          </a:effectRef>
+          <a:fontRef idx="minor"/>
+        </p:style>
+        <p:txBody>
+          <a:bodyPr lIns="90000" tIns="45000" rIns="90000" bIns="45000"/>
+          <a:lstStyle/>
+          <a:p>
+            <a:r>
+              <a:rPr lang="en-US" sz="2600" b="1" strike="noStrike" spc="-1">
+                <a:solidFill>
+                  <a:srgbClr val="DDDDDD"/>
+                </a:solidFill>
+                <a:uFill>
+                  <a:solidFill>
+                    <a:srgbClr val="FFFFFF"/>
+                  </a:solidFill>
+                </a:uFill>
+                <a:latin typeface="Arial"/>
+                <a:ea typeface="DejaVu Sans"/>
+              </a:rPr>
+              <a:t>- Tham khảo thêm một số các giải thuật trên internet. </a:t>
+            </a:r>
+            <a:endParaRPr lang="en-US" sz="1800" b="1" strike="noStrike" spc="-1">
+              <a:solidFill>
+                <a:srgbClr val="DDDDDD"/>
+              </a:solidFill>
+              <a:uFill>
+                <a:solidFill>
+                  <a:srgbClr val="FFFFFF"/>
+                </a:solidFill>
+              </a:uFill>
+              <a:latin typeface="Arial"/>
+            </a:endParaRPr>
+          </a:p>
+          <a:p>
+            <a:endParaRPr lang="en-US" sz="1800" b="1" strike="noStrike" spc="-1">
+              <a:solidFill>
+                <a:srgbClr val="DDDDDD"/>
+              </a:solidFill>
+              <a:uFill>
+                <a:solidFill>
+                  <a:srgbClr val="FFFFFF"/>
+                </a:solidFill>
+              </a:uFill>
+              <a:latin typeface="Arial"/>
+            </a:endParaRPr>
+          </a:p>
+        </p:txBody>
+      </p:sp>
+      <p:sp>
+        <p:nvSpPr>
+          <p:cNvPr id="228" name="CustomShape 7"/>
+          <p:cNvSpPr/>
+          <p:nvPr/>
+        </p:nvSpPr>
+        <p:spPr>
+          <a:xfrm>
+            <a:off x="4305240" y="3183120"/>
+            <a:ext cx="3382200" cy="2303280"/>
+          </a:xfrm>
+          <a:prstGeom prst="rect">
+            <a:avLst/>
+          </a:prstGeom>
+          <a:noFill/>
+          <a:ln>
+            <a:noFill/>
+          </a:ln>
+        </p:spPr>
+        <p:style>
+          <a:lnRef idx="0">
+            <a:scrgbClr r="0" g="0" b="0"/>
+          </a:lnRef>
+          <a:fillRef idx="0">
+            <a:scrgbClr r="0" g="0" b="0"/>
+          </a:fillRef>
+          <a:effectRef idx="0">
+            <a:scrgbClr r="0" g="0" b="0"/>
+          </a:effectRef>
+          <a:fontRef idx="minor"/>
+        </p:style>
+        <p:txBody>
+          <a:bodyPr lIns="90000" tIns="45000" rIns="90000" bIns="45000"/>
+          <a:lstStyle/>
+          <a:p>
+            <a:r>
+              <a:rPr lang="en-US" sz="2600" b="0" strike="noStrike" spc="-1">
+                <a:solidFill>
+                  <a:srgbClr val="000000"/>
+                </a:solidFill>
+                <a:uFill>
+                  <a:solidFill>
+                    <a:srgbClr val="FFFFFF"/>
+                  </a:solidFill>
+                </a:uFill>
+                <a:latin typeface="Arial"/>
+                <a:ea typeface="DejaVu Sans"/>
+              </a:rPr>
+              <a:t> </a:t>
+            </a:r>
+            <a:endParaRPr lang="en-US" sz="1800" b="0" strike="noStrike" spc="-1">
+              <a:solidFill>
+                <a:srgbClr val="B2B2B2"/>
+              </a:solidFill>
+              <a:uFill>
+                <a:solidFill>
+                  <a:srgbClr val="FFFFFF"/>
+                </a:solidFill>
+              </a:uFill>
+              <a:latin typeface="Arial"/>
+            </a:endParaRPr>
+          </a:p>
+          <a:p>
+            <a:endParaRPr lang="en-US" sz="1800" b="0" strike="noStrike" spc="-1">
+              <a:solidFill>
+                <a:srgbClr val="B2B2B2"/>
+              </a:solidFill>
+              <a:uFill>
+                <a:solidFill>
+                  <a:srgbClr val="FFFFFF"/>
+                </a:solidFill>
+              </a:uFill>
+              <a:latin typeface="Arial"/>
+            </a:endParaRPr>
+          </a:p>
+          <a:p>
+            <a:endParaRPr lang="en-US" sz="1800" b="0" strike="noStrike" spc="-1">
+              <a:solidFill>
+                <a:srgbClr val="B2B2B2"/>
+              </a:solidFill>
+              <a:uFill>
+                <a:solidFill>
+                  <a:srgbClr val="FFFFFF"/>
+                </a:solidFill>
+              </a:uFill>
+              <a:latin typeface="Arial"/>
+            </a:endParaRPr>
+          </a:p>
+        </p:txBody>
+      </p:sp>
+      <p:sp>
+        <p:nvSpPr>
+          <p:cNvPr id="229" name="TextShape 8"/>
+          <p:cNvSpPr txBox="1"/>
+          <p:nvPr/>
+        </p:nvSpPr>
+        <p:spPr>
+          <a:xfrm>
+            <a:off x="4305240" y="3656520"/>
+            <a:ext cx="3017520" cy="1109880"/>
+          </a:xfrm>
+          <a:prstGeom prst="rect">
+            <a:avLst/>
+          </a:prstGeom>
+          <a:noFill/>
+          <a:ln>
+            <a:noFill/>
+          </a:ln>
+        </p:spPr>
+        <p:txBody>
+          <a:bodyPr lIns="90000" tIns="45000" rIns="90000" bIns="45000"/>
+          <a:lstStyle/>
+          <a:p>
+            <a:r>
+              <a:rPr lang="en-US" sz="2400" b="1" strike="noStrike" spc="-1">
+                <a:solidFill>
+                  <a:srgbClr val="B2B2B2"/>
+                </a:solidFill>
+                <a:uFill>
+                  <a:solidFill>
+                    <a:srgbClr val="FFFFFF"/>
+                  </a:solidFill>
+                </a:uFill>
+                <a:latin typeface="Arial"/>
+              </a:rPr>
+              <a:t>- Thảo luận với các nhóm đã làm được.</a:t>
+            </a:r>
+          </a:p>
+        </p:txBody>
+      </p:sp>
+    </p:spTree>
+  </p:cSld>
+  <p:clrMapOvr>
+    <a:masterClrMapping/>
+  </p:clrMapOvr>
+  <p:timing>
+    <p:tnLst>
+      <p:par>
+        <p:cTn id="1" dur="indefinite" restart="never" nodeType="tmRoot">
+          <p:childTnLst>
+            <p:seq>
+              <p:cTn id="2" nodeType="mainSeq"/>
+              <p:prevCondLst>
+                <p:cond evt="onPrev" delay="0">
+                  <p:tgtEl>
+                    <p:sldTgt/>
+                  </p:tgtEl>
+                </p:cond>
+              </p:prevCondLst>
+              <p:nextCondLst>
+                <p:cond evt="onNext" delay="0">
+                  <p:tgtEl>
+                    <p:sldTgt/>
+                  </p:tgtEl>
+                </p:cond>
+              </p:nextCondLst>
+            </p:seq>
+          </p:childTnLst>
+        </p:cTn>
+      </p:par>
+    </p:tnLst>
+  </p:timing>
+</p:sld>
+</file>
+
+<file path=ppt/slides/slide11.xml><?xml version="1.0" encoding="utf-8"?>
+<p:sld xmlns:a="http://schemas.openxmlformats.org/drawingml/2006/main" xmlns:r="http://schemas.openxmlformats.org/officeDocument/2006/relationships" xmlns:p="http://schemas.openxmlformats.org/presentationml/2006/main">
+  <p:cSld>
+    <p:spTree>
+      <p:nvGrpSpPr>
+        <p:cNvPr id="1" name=""/>
+        <p:cNvGrpSpPr/>
+        <p:nvPr/>
+      </p:nvGrpSpPr>
+      <p:grpSpPr>
+        <a:xfrm>
+          <a:off x="0" y="0"/>
+          <a:ext cx="0" cy="0"/>
+          <a:chOff x="0" y="0"/>
+          <a:chExt cx="0" cy="0"/>
+        </a:xfrm>
+      </p:grpSpPr>
+      <p:sp>
+        <p:nvSpPr>
+          <p:cNvPr id="230" name="CustomShape 1"/>
+          <p:cNvSpPr/>
+          <p:nvPr/>
+        </p:nvSpPr>
+        <p:spPr>
+          <a:xfrm>
+            <a:off x="914400" y="2205000"/>
+            <a:ext cx="7862760" cy="1451520"/>
+          </a:xfrm>
+          <a:prstGeom prst="rect">
+            <a:avLst/>
+          </a:prstGeom>
+          <a:noFill/>
+          <a:ln>
+            <a:noFill/>
+          </a:ln>
+        </p:spPr>
+        <p:style>
+          <a:lnRef idx="0">
+            <a:scrgbClr r="0" g="0" b="0"/>
+          </a:lnRef>
+          <a:fillRef idx="0">
+            <a:scrgbClr r="0" g="0" b="0"/>
+          </a:fillRef>
+          <a:effectRef idx="0">
+            <a:scrgbClr r="0" g="0" b="0"/>
+          </a:effectRef>
+          <a:fontRef idx="minor"/>
+        </p:style>
+        <p:txBody>
+          <a:bodyPr lIns="90000" tIns="45000" rIns="90000" bIns="45000"/>
+          <a:lstStyle/>
+          <a:p>
+            <a:r>
+              <a:rPr lang="en-US" sz="4800" b="1" strike="noStrike" spc="-1">
+                <a:solidFill>
+                  <a:srgbClr val="DDDDDD"/>
+                </a:solidFill>
+                <a:uFill>
+                  <a:solidFill>
+                    <a:srgbClr val="FFFFFF"/>
+                  </a:solidFill>
+                </a:uFill>
+                <a:latin typeface="Arial"/>
+                <a:ea typeface="DejaVu Sans"/>
+              </a:rPr>
+              <a:t>Thanks For Watching !!!!</a:t>
+            </a:r>
+            <a:endParaRPr lang="en-US" sz="1800" b="0" strike="noStrike" spc="-1">
+              <a:solidFill>
+                <a:srgbClr val="DDDDDD"/>
+              </a:solidFill>
+              <a:uFill>
+                <a:solidFill>
+                  <a:srgbClr val="FFFFFF"/>
+                </a:solidFill>
+              </a:uFill>
+              <a:latin typeface="Arial"/>
+            </a:endParaRPr>
+          </a:p>
+        </p:txBody>
+      </p:sp>
+      <p:pic>
+        <p:nvPicPr>
+          <p:cNvPr id="231" name="Picture 230"/>
+          <p:cNvPicPr/>
+          <p:nvPr/>
+        </p:nvPicPr>
+        <p:blipFill>
+          <a:blip r:embed="rId2"/>
+          <a:stretch/>
+        </p:blipFill>
+        <p:spPr>
+          <a:xfrm>
+            <a:off x="2095920" y="3656520"/>
+            <a:ext cx="4762080" cy="2009520"/>
+          </a:xfrm>
+          <a:prstGeom prst="rect">
+            <a:avLst/>
+          </a:prstGeom>
+          <a:ln>
+            <a:noFill/>
+          </a:ln>
+        </p:spPr>
+      </p:pic>
+    </p:spTree>
+  </p:cSld>
+  <p:clrMapOvr>
+    <a:masterClrMapping/>
+  </p:clrMapOvr>
+  <p:timing>
+    <p:tnLst>
+      <p:par>
+        <p:cTn id="1" dur="indefinite" restart="never" nodeType="tmRoot">
+          <p:childTnLst>
+            <p:seq>
+              <p:cTn id="2" nodeType="mainSeq"/>
+              <p:prevCondLst>
+                <p:cond evt="onPrev" delay="0">
+                  <p:tgtEl>
+                    <p:sldTgt/>
+                  </p:tgtEl>
+                </p:cond>
+              </p:prevCondLst>
+              <p:nextCondLst>
+                <p:cond evt="onNext" delay="0">
+                  <p:tgtEl>
+                    <p:sldTgt/>
+                  </p:tgtEl>
+                </p:cond>
+              </p:nextCondLst>
+            </p:seq>
+          </p:childTnLst>
+        </p:cTn>
+      </p:par>
+    </p:tnLst>
+  </p:timing>
+</p:sld>
+</file>
+
 <file path=ppt/slides/slide2.xml><?xml version="1.0" encoding="utf-8"?>
 <p:sld xmlns:a="http://schemas.openxmlformats.org/drawingml/2006/main" xmlns:r="http://schemas.openxmlformats.org/officeDocument/2006/relationships" xmlns:p="http://schemas.openxmlformats.org/presentationml/2006/main">
   <p:cSld>
@@ -13058,7 +13848,7 @@
         </p:blipFill>
         <p:spPr>
           <a:xfrm>
-            <a:off x="4876472" y="1123200"/>
+            <a:off x="4743110" y="1123200"/>
             <a:ext cx="3522945" cy="5496947"/>
           </a:xfrm>
           <a:prstGeom prst="rect">
@@ -13120,192 +13910,172 @@
       </p:grpSpPr>
       <p:sp>
         <p:nvSpPr>
-          <p:cNvPr id="217" name="CustomShape 1"/>
-          <p:cNvSpPr/>
-          <p:nvPr/>
-        </p:nvSpPr>
-        <p:spPr>
-          <a:xfrm>
-            <a:off x="457200" y="413640"/>
-            <a:ext cx="8228160" cy="709560"/>
-          </a:xfrm>
-          <a:prstGeom prst="rect">
-            <a:avLst/>
-          </a:prstGeom>
-          <a:noFill/>
-          <a:ln>
-            <a:noFill/>
-          </a:ln>
-        </p:spPr>
-        <p:style>
-          <a:lnRef idx="0">
-            <a:scrgbClr r="0" g="0" b="0"/>
-          </a:lnRef>
-          <a:fillRef idx="0">
-            <a:scrgbClr r="0" g="0" b="0"/>
-          </a:fillRef>
-          <a:effectRef idx="0">
-            <a:scrgbClr r="0" g="0" b="0"/>
-          </a:effectRef>
-          <a:fontRef idx="minor"/>
-        </p:style>
-        <p:txBody>
-          <a:bodyPr lIns="0" tIns="0" rIns="0" bIns="0" anchor="ctr"/>
+          <p:cNvPr id="2" name="Title 1"/>
+          <p:cNvSpPr>
+            <a:spLocks noGrp="1"/>
+          </p:cNvSpPr>
+          <p:nvPr>
+            <p:ph type="title"/>
+          </p:nvPr>
+        </p:nvSpPr>
+        <p:spPr/>
+        <p:txBody>
+          <a:bodyPr/>
           <a:lstStyle/>
           <a:p>
             <a:r>
-              <a:rPr lang="en-US" sz="3600" b="1" u="sng" strike="noStrike" spc="-1">
-                <a:solidFill>
-                  <a:srgbClr val="CCCCCC"/>
-                </a:solidFill>
-                <a:uFill>
-                  <a:solidFill>
-                    <a:srgbClr val="FFFFFF"/>
-                  </a:solidFill>
-                </a:uFill>
-                <a:latin typeface="Calibri"/>
-                <a:ea typeface="DejaVu Sans"/>
+              <a:rPr lang="en-US"/>
+              <a:t> </a:t>
+            </a:r>
+            <a:r>
+              <a:rPr lang="en-US">
+                <a:solidFill>
+                  <a:schemeClr val="bg1"/>
+                </a:solidFill>
               </a:rPr>
-              <a:t>Sever</a:t>
+              <a:t>Server</a:t>
             </a:r>
-            <a:endParaRPr lang="en-US" sz="3600" b="0" strike="noStrike" spc="-1">
-              <a:solidFill>
-                <a:srgbClr val="CCCCCC"/>
-              </a:solidFill>
-              <a:uFill>
-                <a:solidFill>
-                  <a:srgbClr val="FFFFFF"/>
-                </a:solidFill>
-              </a:uFill>
-              <a:latin typeface="Arial"/>
-            </a:endParaRPr>
+          </a:p>
+        </p:txBody>
+      </p:sp>
+      <p:sp>
+        <p:nvSpPr>
+          <p:cNvPr id="3" name="Subtitle 2"/>
+          <p:cNvSpPr>
+            <a:spLocks noGrp="1"/>
+          </p:cNvSpPr>
+          <p:nvPr>
+            <p:ph type="subTitle"/>
+          </p:nvPr>
+        </p:nvSpPr>
+        <p:spPr/>
+        <p:txBody>
+          <a:bodyPr/>
+          <a:lstStyle/>
+          <a:p>
+            <a:endParaRPr lang="en-US">
+              <a:solidFill>
+                <a:schemeClr val="bg1"/>
+              </a:solidFill>
+            </a:endParaRPr>
+          </a:p>
+          <a:p>
+            <a:endParaRPr lang="en-US">
+              <a:solidFill>
+                <a:schemeClr val="bg1"/>
+              </a:solidFill>
+            </a:endParaRPr>
+          </a:p>
+          <a:p>
+            <a:endParaRPr lang="en-US">
+              <a:solidFill>
+                <a:schemeClr val="bg1"/>
+              </a:solidFill>
+            </a:endParaRPr>
+          </a:p>
+          <a:p>
+            <a:endParaRPr lang="en-US">
+              <a:solidFill>
+                <a:schemeClr val="bg1"/>
+              </a:solidFill>
+            </a:endParaRPr>
+          </a:p>
+          <a:p>
+            <a:endParaRPr lang="en-US">
+              <a:solidFill>
+                <a:schemeClr val="bg1"/>
+              </a:solidFill>
+            </a:endParaRPr>
+          </a:p>
+          <a:p>
+            <a:endParaRPr lang="en-US">
+              <a:solidFill>
+                <a:schemeClr val="bg1"/>
+              </a:solidFill>
+            </a:endParaRPr>
+          </a:p>
+          <a:p>
+            <a:r>
+              <a:rPr lang="en-US">
+                <a:solidFill>
+                  <a:schemeClr val="bg1"/>
+                </a:solidFill>
+              </a:rPr>
+              <a:t>Đã hoàn thành thư viện kết nối mongodb cho ứng dụng crawler data và app android</a:t>
+            </a:r>
           </a:p>
         </p:txBody>
       </p:sp>
       <p:pic>
         <p:nvPicPr>
-          <p:cNvPr id="218" name="Picture 217"/>
-          <p:cNvPicPr/>
+          <p:cNvPr id="4" name="Picture 3"/>
+          <p:cNvPicPr>
+            <a:picLocks noChangeAspect="1"/>
+          </p:cNvPicPr>
           <p:nvPr/>
         </p:nvPicPr>
         <p:blipFill>
-          <a:blip r:embed="rId2"/>
-          <a:stretch/>
+          <a:blip r:embed="rId2">
+            <a:extLst>
+              <a:ext uri="{28A0092B-C50C-407E-A947-70E740481C1C}">
+                <a14:useLocalDpi xmlns:a14="http://schemas.microsoft.com/office/drawing/2010/main" val="0"/>
+              </a:ext>
+            </a:extLst>
+          </a:blip>
+          <a:stretch>
+            <a:fillRect/>
+          </a:stretch>
         </p:blipFill>
         <p:spPr>
           <a:xfrm>
-            <a:off x="4662000" y="3896640"/>
-            <a:ext cx="4297680" cy="2685960"/>
-          </a:xfrm>
-          <a:prstGeom prst="rect">
-            <a:avLst/>
-          </a:prstGeom>
-          <a:ln>
-            <a:noFill/>
-          </a:ln>
+            <a:off x="1077753" y="4083135"/>
+            <a:ext cx="1929357" cy="1473981"/>
+          </a:xfrm>
+          <a:prstGeom prst="rect">
+            <a:avLst/>
+          </a:prstGeom>
         </p:spPr>
       </p:pic>
       <p:pic>
         <p:nvPicPr>
-          <p:cNvPr id="219" name="Picture 218"/>
-          <p:cNvPicPr/>
+          <p:cNvPr id="5" name="Picture 4"/>
+          <p:cNvPicPr>
+            <a:picLocks noChangeAspect="1"/>
+          </p:cNvPicPr>
           <p:nvPr/>
         </p:nvPicPr>
         <p:blipFill>
-          <a:blip r:embed="rId3"/>
-          <a:stretch/>
+          <a:blip r:embed="rId3">
+            <a:extLst>
+              <a:ext uri="{28A0092B-C50C-407E-A947-70E740481C1C}">
+                <a14:useLocalDpi xmlns:a14="http://schemas.microsoft.com/office/drawing/2010/main" val="0"/>
+              </a:ext>
+            </a:extLst>
+          </a:blip>
+          <a:stretch>
+            <a:fillRect/>
+          </a:stretch>
         </p:blipFill>
         <p:spPr>
           <a:xfrm>
-            <a:off x="274320" y="3841920"/>
-            <a:ext cx="4386600" cy="2741040"/>
-          </a:xfrm>
-          <a:prstGeom prst="rect">
-            <a:avLst/>
-          </a:prstGeom>
-          <a:ln>
-            <a:noFill/>
-          </a:ln>
-        </p:spPr>
-      </p:pic>
-      <p:pic>
-        <p:nvPicPr>
-          <p:cNvPr id="220" name="Picture 219"/>
-          <p:cNvPicPr/>
-          <p:nvPr/>
-        </p:nvPicPr>
-        <p:blipFill>
-          <a:blip r:embed="rId4"/>
-          <a:stretch/>
-        </p:blipFill>
-        <p:spPr>
-          <a:xfrm>
-            <a:off x="4206240" y="1044720"/>
-            <a:ext cx="4665960" cy="2703600"/>
-          </a:xfrm>
-          <a:prstGeom prst="rect">
-            <a:avLst/>
-          </a:prstGeom>
-          <a:ln>
-            <a:noFill/>
-          </a:ln>
-        </p:spPr>
-      </p:pic>
-      <p:pic>
-        <p:nvPicPr>
-          <p:cNvPr id="221" name="Picture 220"/>
-          <p:cNvPicPr/>
-          <p:nvPr/>
-        </p:nvPicPr>
-        <p:blipFill>
-          <a:blip r:embed="rId5"/>
-          <a:stretch/>
-        </p:blipFill>
-        <p:spPr>
-          <a:xfrm>
-            <a:off x="255240" y="1188720"/>
-            <a:ext cx="3929760" cy="2468160"/>
-          </a:xfrm>
-          <a:prstGeom prst="rect">
-            <a:avLst/>
-          </a:prstGeom>
-          <a:ln>
-            <a:noFill/>
-          </a:ln>
+            <a:off x="5557021" y="4162425"/>
+            <a:ext cx="2101784" cy="1315402"/>
+          </a:xfrm>
+          <a:prstGeom prst="rect">
+            <a:avLst/>
+          </a:prstGeom>
         </p:spPr>
       </p:pic>
     </p:spTree>
+    <p:extLst>
+      <p:ext uri="{BB962C8B-B14F-4D97-AF65-F5344CB8AC3E}">
+        <p14:creationId xmlns:p14="http://schemas.microsoft.com/office/powerpoint/2010/main" val="2168710710"/>
+      </p:ext>
+    </p:extLst>
   </p:cSld>
   <p:clrMapOvr>
     <a:masterClrMapping/>
   </p:clrMapOvr>
-  <p:timing>
-    <p:tnLst>
-      <p:par>
-        <p:cTn id="1" dur="indefinite" restart="never" nodeType="tmRoot">
-          <p:childTnLst>
-            <p:seq>
-              <p:cTn id="2" nodeType="mainSeq"/>
-              <p:prevCondLst>
-                <p:cond evt="onPrev" delay="0">
-                  <p:tgtEl>
-                    <p:sldTgt/>
-                  </p:tgtEl>
-                </p:cond>
-              </p:prevCondLst>
-              <p:nextCondLst>
-                <p:cond evt="onNext" delay="0">
-                  <p:tgtEl>
-                    <p:sldTgt/>
-                  </p:tgtEl>
-                </p:cond>
-              </p:nextCondLst>
-            </p:seq>
-          </p:childTnLst>
-        </p:cTn>
-      </p:par>
-    </p:tnLst>
-  </p:timing>
 </p:sld>
 </file>
 
@@ -13328,7 +14098,7 @@
       </p:grpSpPr>
       <p:sp>
         <p:nvSpPr>
-          <p:cNvPr id="222" name="CustomShape 1"/>
+          <p:cNvPr id="217" name="CustomShape 1"/>
           <p:cNvSpPr/>
           <p:nvPr/>
         </p:nvSpPr>
@@ -13358,13 +14128,13 @@
           <a:fontRef idx="minor"/>
         </p:style>
         <p:txBody>
-          <a:bodyPr lIns="122040" tIns="60840" rIns="122040" bIns="60840" anchor="ctr"/>
+          <a:bodyPr lIns="0" tIns="0" rIns="0" bIns="0" anchor="ctr"/>
           <a:lstStyle/>
           <a:p>
             <a:r>
-              <a:rPr lang="en-US" sz="3200" b="1" strike="noStrike" spc="-1">
-                <a:solidFill>
-                  <a:srgbClr val="FFFFFF"/>
+              <a:rPr lang="en-US" sz="3600" b="1" u="sng" strike="noStrike" spc="-1">
+                <a:solidFill>
+                  <a:srgbClr val="CCCCCC"/>
                 </a:solidFill>
                 <a:uFill>
                   <a:solidFill>
@@ -13374,537 +14144,12 @@
                 <a:latin typeface="Calibri"/>
                 <a:ea typeface="DejaVu Sans"/>
               </a:rPr>
-              <a:t>Problems</a:t>
+              <a:t>Serve</a:t>
             </a:r>
-            <a:endParaRPr lang="en-US" sz="1800" b="0" strike="noStrike" spc="-1">
-              <a:solidFill>
-                <a:srgbClr val="B2B2B2"/>
-              </a:solidFill>
-              <a:uFill>
-                <a:solidFill>
-                  <a:srgbClr val="FFFFFF"/>
-                </a:solidFill>
-              </a:uFill>
-              <a:latin typeface="Arial"/>
-            </a:endParaRPr>
-          </a:p>
-        </p:txBody>
-      </p:sp>
-      <p:sp>
-        <p:nvSpPr>
-          <p:cNvPr id="223" name="CustomShape 2"/>
-          <p:cNvSpPr/>
-          <p:nvPr/>
-        </p:nvSpPr>
-        <p:spPr>
-          <a:xfrm>
-            <a:off x="457200" y="1554480"/>
-            <a:ext cx="2467800" cy="458280"/>
-          </a:xfrm>
-          <a:prstGeom prst="rect">
-            <a:avLst/>
-          </a:prstGeom>
-          <a:noFill/>
-          <a:ln>
-            <a:noFill/>
-          </a:ln>
-        </p:spPr>
-        <p:style>
-          <a:lnRef idx="0">
-            <a:scrgbClr r="0" g="0" b="0"/>
-          </a:lnRef>
-          <a:fillRef idx="0">
-            <a:scrgbClr r="0" g="0" b="0"/>
-          </a:fillRef>
-          <a:effectRef idx="0">
-            <a:scrgbClr r="0" g="0" b="0"/>
-          </a:effectRef>
-          <a:fontRef idx="minor"/>
-        </p:style>
-        <p:txBody>
-          <a:bodyPr lIns="90000" tIns="45000" rIns="90000" bIns="45000"/>
-          <a:lstStyle/>
-          <a:p>
-            <a:pPr algn="just">
-              <a:lnSpc>
-                <a:spcPct val="100000"/>
-              </a:lnSpc>
-            </a:pPr>
             <a:r>
-              <a:rPr lang="en-US" sz="2600" b="1" strike="noStrike" spc="-1">
-                <a:solidFill>
-                  <a:srgbClr val="B2B2B2"/>
-                </a:solidFill>
-                <a:uFill>
-                  <a:solidFill>
-                    <a:srgbClr val="FFFFFF"/>
-                  </a:solidFill>
-                </a:uFill>
-                <a:latin typeface="Arial"/>
-                <a:ea typeface="DejaVu Sans"/>
-              </a:rPr>
-              <a:t>Khó Khăn:</a:t>
-            </a:r>
-            <a:endParaRPr lang="en-US" sz="1800" b="0" strike="noStrike" spc="-1">
-              <a:solidFill>
-                <a:srgbClr val="B2B2B2"/>
-              </a:solidFill>
-              <a:uFill>
-                <a:solidFill>
-                  <a:srgbClr val="FFFFFF"/>
-                </a:solidFill>
-              </a:uFill>
-              <a:latin typeface="Arial"/>
-            </a:endParaRPr>
-          </a:p>
-        </p:txBody>
-      </p:sp>
-      <p:sp>
-        <p:nvSpPr>
-          <p:cNvPr id="224" name="CustomShape 3"/>
-          <p:cNvSpPr/>
-          <p:nvPr/>
-        </p:nvSpPr>
-        <p:spPr>
-          <a:xfrm>
-            <a:off x="4846320" y="1554480"/>
-            <a:ext cx="3473640" cy="827280"/>
-          </a:xfrm>
-          <a:prstGeom prst="rect">
-            <a:avLst/>
-          </a:prstGeom>
-          <a:noFill/>
-          <a:ln>
-            <a:noFill/>
-          </a:ln>
-        </p:spPr>
-        <p:style>
-          <a:lnRef idx="0">
-            <a:scrgbClr r="0" g="0" b="0"/>
-          </a:lnRef>
-          <a:fillRef idx="0">
-            <a:scrgbClr r="0" g="0" b="0"/>
-          </a:fillRef>
-          <a:effectRef idx="0">
-            <a:scrgbClr r="0" g="0" b="0"/>
-          </a:effectRef>
-          <a:fontRef idx="minor"/>
-        </p:style>
-        <p:txBody>
-          <a:bodyPr lIns="90000" tIns="45000" rIns="90000" bIns="45000"/>
-          <a:lstStyle/>
-          <a:p>
-            <a:r>
-              <a:rPr lang="en-US" sz="2600" b="1" strike="noStrike" spc="-1">
+              <a:rPr lang="en-US" sz="3600" spc="-1">
                 <a:solidFill>
                   <a:srgbClr val="CCCCCC"/>
-                </a:solidFill>
-                <a:uFill>
-                  <a:solidFill>
-                    <a:srgbClr val="FFFFFF"/>
-                  </a:solidFill>
-                </a:uFill>
-                <a:latin typeface="Arial"/>
-                <a:ea typeface="DejaVu Sans"/>
-              </a:rPr>
-              <a:t>Hướng giải quyết:</a:t>
-            </a:r>
-            <a:endParaRPr lang="en-US" sz="1800" b="0" strike="noStrike" spc="-1">
-              <a:solidFill>
-                <a:srgbClr val="CCCCCC"/>
-              </a:solidFill>
-              <a:uFill>
-                <a:solidFill>
-                  <a:srgbClr val="FFFFFF"/>
-                </a:solidFill>
-              </a:uFill>
-              <a:latin typeface="Arial"/>
-            </a:endParaRPr>
-          </a:p>
-        </p:txBody>
-      </p:sp>
-      <p:sp>
-        <p:nvSpPr>
-          <p:cNvPr id="225" name="Line 4"/>
-          <p:cNvSpPr/>
-          <p:nvPr/>
-        </p:nvSpPr>
-        <p:spPr>
-          <a:xfrm>
-            <a:off x="4114800" y="1645920"/>
-            <a:ext cx="91440" cy="3931920"/>
-          </a:xfrm>
-          <a:prstGeom prst="line">
-            <a:avLst/>
-          </a:prstGeom>
-          <a:ln>
-            <a:solidFill>
-              <a:srgbClr val="000000"/>
-            </a:solidFill>
-          </a:ln>
-        </p:spPr>
-        <p:style>
-          <a:lnRef idx="0">
-            <a:scrgbClr r="0" g="0" b="0"/>
-          </a:lnRef>
-          <a:fillRef idx="0">
-            <a:scrgbClr r="0" g="0" b="0"/>
-          </a:fillRef>
-          <a:effectRef idx="0">
-            <a:scrgbClr r="0" g="0" b="0"/>
-          </a:effectRef>
-          <a:fontRef idx="minor"/>
-        </p:style>
-      </p:sp>
-      <p:sp>
-        <p:nvSpPr>
-          <p:cNvPr id="226" name="CustomShape 5"/>
-          <p:cNvSpPr/>
-          <p:nvPr/>
-        </p:nvSpPr>
-        <p:spPr>
-          <a:xfrm>
-            <a:off x="548640" y="2194560"/>
-            <a:ext cx="3107880" cy="2808000"/>
-          </a:xfrm>
-          <a:prstGeom prst="rect">
-            <a:avLst/>
-          </a:prstGeom>
-          <a:noFill/>
-          <a:ln>
-            <a:noFill/>
-          </a:ln>
-        </p:spPr>
-        <p:style>
-          <a:lnRef idx="0">
-            <a:scrgbClr r="0" g="0" b="0"/>
-          </a:lnRef>
-          <a:fillRef idx="0">
-            <a:scrgbClr r="0" g="0" b="0"/>
-          </a:fillRef>
-          <a:effectRef idx="0">
-            <a:scrgbClr r="0" g="0" b="0"/>
-          </a:effectRef>
-          <a:fontRef idx="minor"/>
-        </p:style>
-        <p:txBody>
-          <a:bodyPr lIns="90000" tIns="45000" rIns="90000" bIns="45000"/>
-          <a:lstStyle/>
-          <a:p>
-            <a:r>
-              <a:rPr lang="en-US" sz="2400" b="0" strike="noStrike" spc="-1">
-                <a:solidFill>
-                  <a:srgbClr val="DDDDDD"/>
-                </a:solidFill>
-                <a:uFill>
-                  <a:solidFill>
-                    <a:srgbClr val="FFFFFF"/>
-                  </a:solidFill>
-                </a:uFill>
-                <a:latin typeface="Arial"/>
-                <a:ea typeface="DejaVu Sans"/>
-              </a:rPr>
-              <a:t>- Thuật toán. </a:t>
-            </a:r>
-            <a:endParaRPr lang="en-US" sz="1800" b="0" strike="noStrike" spc="-1">
-              <a:solidFill>
-                <a:srgbClr val="DDDDDD"/>
-              </a:solidFill>
-              <a:uFill>
-                <a:solidFill>
-                  <a:srgbClr val="FFFFFF"/>
-                </a:solidFill>
-              </a:uFill>
-              <a:latin typeface="Arial"/>
-            </a:endParaRPr>
-          </a:p>
-          <a:p>
-            <a:endParaRPr lang="en-US" sz="1800" b="0" strike="noStrike" spc="-1">
-              <a:solidFill>
-                <a:srgbClr val="DDDDDD"/>
-              </a:solidFill>
-              <a:uFill>
-                <a:solidFill>
-                  <a:srgbClr val="FFFFFF"/>
-                </a:solidFill>
-              </a:uFill>
-              <a:latin typeface="Arial"/>
-            </a:endParaRPr>
-          </a:p>
-          <a:p>
-            <a:endParaRPr lang="en-US" sz="1800" b="0" strike="noStrike" spc="-1">
-              <a:solidFill>
-                <a:srgbClr val="DDDDDD"/>
-              </a:solidFill>
-              <a:uFill>
-                <a:solidFill>
-                  <a:srgbClr val="FFFFFF"/>
-                </a:solidFill>
-              </a:uFill>
-              <a:latin typeface="Arial"/>
-            </a:endParaRPr>
-          </a:p>
-          <a:p>
-            <a:endParaRPr lang="en-US" sz="1800" b="0" strike="noStrike" spc="-1">
-              <a:solidFill>
-                <a:srgbClr val="DDDDDD"/>
-              </a:solidFill>
-              <a:uFill>
-                <a:solidFill>
-                  <a:srgbClr val="FFFFFF"/>
-                </a:solidFill>
-              </a:uFill>
-              <a:latin typeface="Arial"/>
-            </a:endParaRPr>
-          </a:p>
-          <a:p>
-            <a:endParaRPr lang="en-US" sz="1800" b="0" strike="noStrike" spc="-1">
-              <a:solidFill>
-                <a:srgbClr val="DDDDDD"/>
-              </a:solidFill>
-              <a:uFill>
-                <a:solidFill>
-                  <a:srgbClr val="FFFFFF"/>
-                </a:solidFill>
-              </a:uFill>
-              <a:latin typeface="Arial"/>
-            </a:endParaRPr>
-          </a:p>
-          <a:p>
-            <a:endParaRPr lang="en-US" sz="1800" b="0" strike="noStrike" spc="-1">
-              <a:solidFill>
-                <a:srgbClr val="DDDDDD"/>
-              </a:solidFill>
-              <a:uFill>
-                <a:solidFill>
-                  <a:srgbClr val="FFFFFF"/>
-                </a:solidFill>
-              </a:uFill>
-              <a:latin typeface="Arial"/>
-            </a:endParaRPr>
-          </a:p>
-          <a:p>
-            <a:endParaRPr lang="en-US" sz="1800" b="0" strike="noStrike" spc="-1">
-              <a:solidFill>
-                <a:srgbClr val="DDDDDD"/>
-              </a:solidFill>
-              <a:uFill>
-                <a:solidFill>
-                  <a:srgbClr val="FFFFFF"/>
-                </a:solidFill>
-              </a:uFill>
-              <a:latin typeface="Arial"/>
-            </a:endParaRPr>
-          </a:p>
-          <a:p>
-            <a:endParaRPr lang="en-US" sz="1800" b="0" strike="noStrike" spc="-1">
-              <a:solidFill>
-                <a:srgbClr val="DDDDDD"/>
-              </a:solidFill>
-              <a:uFill>
-                <a:solidFill>
-                  <a:srgbClr val="FFFFFF"/>
-                </a:solidFill>
-              </a:uFill>
-              <a:latin typeface="Arial"/>
-            </a:endParaRPr>
-          </a:p>
-        </p:txBody>
-      </p:sp>
-      <p:sp>
-        <p:nvSpPr>
-          <p:cNvPr id="227" name="CustomShape 6"/>
-          <p:cNvSpPr/>
-          <p:nvPr/>
-        </p:nvSpPr>
-        <p:spPr>
-          <a:xfrm>
-            <a:off x="4297680" y="2091240"/>
-            <a:ext cx="3382200" cy="1565280"/>
-          </a:xfrm>
-          <a:prstGeom prst="rect">
-            <a:avLst/>
-          </a:prstGeom>
-          <a:noFill/>
-          <a:ln>
-            <a:noFill/>
-          </a:ln>
-        </p:spPr>
-        <p:style>
-          <a:lnRef idx="0">
-            <a:scrgbClr r="0" g="0" b="0"/>
-          </a:lnRef>
-          <a:fillRef idx="0">
-            <a:scrgbClr r="0" g="0" b="0"/>
-          </a:fillRef>
-          <a:effectRef idx="0">
-            <a:scrgbClr r="0" g="0" b="0"/>
-          </a:effectRef>
-          <a:fontRef idx="minor"/>
-        </p:style>
-        <p:txBody>
-          <a:bodyPr lIns="90000" tIns="45000" rIns="90000" bIns="45000"/>
-          <a:lstStyle/>
-          <a:p>
-            <a:r>
-              <a:rPr lang="en-US" sz="2600" b="1" strike="noStrike" spc="-1">
-                <a:solidFill>
-                  <a:srgbClr val="DDDDDD"/>
-                </a:solidFill>
-                <a:uFill>
-                  <a:solidFill>
-                    <a:srgbClr val="FFFFFF"/>
-                  </a:solidFill>
-                </a:uFill>
-                <a:latin typeface="Arial"/>
-                <a:ea typeface="DejaVu Sans"/>
-              </a:rPr>
-              <a:t>- Tham khảo thêm một số các giải thuật trên internet. </a:t>
-            </a:r>
-            <a:endParaRPr lang="en-US" sz="1800" b="1" strike="noStrike" spc="-1">
-              <a:solidFill>
-                <a:srgbClr val="DDDDDD"/>
-              </a:solidFill>
-              <a:uFill>
-                <a:solidFill>
-                  <a:srgbClr val="FFFFFF"/>
-                </a:solidFill>
-              </a:uFill>
-              <a:latin typeface="Arial"/>
-            </a:endParaRPr>
-          </a:p>
-          <a:p>
-            <a:endParaRPr lang="en-US" sz="1800" b="1" strike="noStrike" spc="-1">
-              <a:solidFill>
-                <a:srgbClr val="DDDDDD"/>
-              </a:solidFill>
-              <a:uFill>
-                <a:solidFill>
-                  <a:srgbClr val="FFFFFF"/>
-                </a:solidFill>
-              </a:uFill>
-              <a:latin typeface="Arial"/>
-            </a:endParaRPr>
-          </a:p>
-        </p:txBody>
-      </p:sp>
-      <p:sp>
-        <p:nvSpPr>
-          <p:cNvPr id="228" name="CustomShape 7"/>
-          <p:cNvSpPr/>
-          <p:nvPr/>
-        </p:nvSpPr>
-        <p:spPr>
-          <a:xfrm>
-            <a:off x="4305240" y="3183120"/>
-            <a:ext cx="3382200" cy="2303280"/>
-          </a:xfrm>
-          <a:prstGeom prst="rect">
-            <a:avLst/>
-          </a:prstGeom>
-          <a:noFill/>
-          <a:ln>
-            <a:noFill/>
-          </a:ln>
-        </p:spPr>
-        <p:style>
-          <a:lnRef idx="0">
-            <a:scrgbClr r="0" g="0" b="0"/>
-          </a:lnRef>
-          <a:fillRef idx="0">
-            <a:scrgbClr r="0" g="0" b="0"/>
-          </a:fillRef>
-          <a:effectRef idx="0">
-            <a:scrgbClr r="0" g="0" b="0"/>
-          </a:effectRef>
-          <a:fontRef idx="minor"/>
-        </p:style>
-        <p:txBody>
-          <a:bodyPr lIns="90000" tIns="45000" rIns="90000" bIns="45000"/>
-          <a:lstStyle/>
-          <a:p>
-            <a:r>
-              <a:rPr lang="en-US" sz="2600" b="0" strike="noStrike" spc="-1">
-                <a:solidFill>
-                  <a:srgbClr val="000000"/>
-                </a:solidFill>
-                <a:uFill>
-                  <a:solidFill>
-                    <a:srgbClr val="FFFFFF"/>
-                  </a:solidFill>
-                </a:uFill>
-                <a:latin typeface="Arial"/>
-                <a:ea typeface="DejaVu Sans"/>
-              </a:rPr>
-              <a:t> </a:t>
-            </a:r>
-            <a:endParaRPr lang="en-US" sz="1800" b="0" strike="noStrike" spc="-1">
-              <a:solidFill>
-                <a:srgbClr val="B2B2B2"/>
-              </a:solidFill>
-              <a:uFill>
-                <a:solidFill>
-                  <a:srgbClr val="FFFFFF"/>
-                </a:solidFill>
-              </a:uFill>
-              <a:latin typeface="Arial"/>
-            </a:endParaRPr>
-          </a:p>
-          <a:p>
-            <a:endParaRPr lang="en-US" sz="1800" b="0" strike="noStrike" spc="-1">
-              <a:solidFill>
-                <a:srgbClr val="B2B2B2"/>
-              </a:solidFill>
-              <a:uFill>
-                <a:solidFill>
-                  <a:srgbClr val="FFFFFF"/>
-                </a:solidFill>
-              </a:uFill>
-              <a:latin typeface="Arial"/>
-            </a:endParaRPr>
-          </a:p>
-          <a:p>
-            <a:endParaRPr lang="en-US" sz="1800" b="0" strike="noStrike" spc="-1">
-              <a:solidFill>
-                <a:srgbClr val="B2B2B2"/>
-              </a:solidFill>
-              <a:uFill>
-                <a:solidFill>
-                  <a:srgbClr val="FFFFFF"/>
-                </a:solidFill>
-              </a:uFill>
-              <a:latin typeface="Arial"/>
-            </a:endParaRPr>
-          </a:p>
-        </p:txBody>
-      </p:sp>
-      <p:sp>
-        <p:nvSpPr>
-          <p:cNvPr id="229" name="TextShape 8"/>
-          <p:cNvSpPr txBox="1"/>
-          <p:nvPr/>
-        </p:nvSpPr>
-        <p:spPr>
-          <a:xfrm>
-            <a:off x="4305240" y="3656520"/>
-            <a:ext cx="3017520" cy="1109880"/>
-          </a:xfrm>
-          <a:prstGeom prst="rect">
-            <a:avLst/>
-          </a:prstGeom>
-          <a:noFill/>
-          <a:ln>
-            <a:noFill/>
-          </a:ln>
-        </p:spPr>
-        <p:txBody>
-          <a:bodyPr lIns="90000" tIns="45000" rIns="90000" bIns="45000"/>
-          <a:lstStyle/>
-          <a:p>
-            <a:r>
-              <a:rPr lang="en-US" sz="2400" b="1" strike="noStrike" spc="-1">
-                <a:solidFill>
-                  <a:srgbClr val="B2B2B2"/>
                 </a:solidFill>
                 <a:uFill>
                   <a:solidFill>
@@ -13913,11 +14158,113 @@
                 </a:uFill>
                 <a:latin typeface="Arial"/>
               </a:rPr>
-              <a:t>- Thảo luận với các nhóm đã làm được.</a:t>
+              <a:t>r</a:t>
             </a:r>
-          </a:p>
-        </p:txBody>
-      </p:sp>
+            <a:endParaRPr lang="en-US" sz="3600" b="1" u="sng" strike="noStrike" spc="-1">
+              <a:solidFill>
+                <a:srgbClr val="CCCCCC"/>
+              </a:solidFill>
+              <a:uFill>
+                <a:solidFill>
+                  <a:srgbClr val="FFFFFF"/>
+                </a:solidFill>
+              </a:uFill>
+              <a:latin typeface="Calibri"/>
+              <a:ea typeface="DejaVu Sans"/>
+            </a:endParaRPr>
+          </a:p>
+        </p:txBody>
+      </p:sp>
+      <p:pic>
+        <p:nvPicPr>
+          <p:cNvPr id="3" name="Picture 2"/>
+          <p:cNvPicPr>
+            <a:picLocks noChangeAspect="1"/>
+          </p:cNvPicPr>
+          <p:nvPr/>
+        </p:nvPicPr>
+        <p:blipFill>
+          <a:blip r:embed="rId2">
+            <a:extLst>
+              <a:ext uri="{28A0092B-C50C-407E-A947-70E740481C1C}">
+                <a14:useLocalDpi xmlns:a14="http://schemas.microsoft.com/office/drawing/2010/main" val="0"/>
+              </a:ext>
+            </a:extLst>
+          </a:blip>
+          <a:stretch>
+            <a:fillRect/>
+          </a:stretch>
+        </p:blipFill>
+        <p:spPr>
+          <a:xfrm>
+            <a:off x="4148211" y="768420"/>
+            <a:ext cx="4537149" cy="2550901"/>
+          </a:xfrm>
+          <a:prstGeom prst="rect">
+            <a:avLst/>
+          </a:prstGeom>
+        </p:spPr>
+      </p:pic>
+      <p:pic>
+        <p:nvPicPr>
+          <p:cNvPr id="4" name="Picture 3"/>
+          <p:cNvPicPr>
+            <a:picLocks noChangeAspect="1"/>
+          </p:cNvPicPr>
+          <p:nvPr/>
+        </p:nvPicPr>
+        <p:blipFill>
+          <a:blip r:embed="rId3">
+            <a:extLst>
+              <a:ext uri="{28A0092B-C50C-407E-A947-70E740481C1C}">
+                <a14:useLocalDpi xmlns:a14="http://schemas.microsoft.com/office/drawing/2010/main" val="0"/>
+              </a:ext>
+            </a:extLst>
+          </a:blip>
+          <a:stretch>
+            <a:fillRect/>
+          </a:stretch>
+        </p:blipFill>
+        <p:spPr>
+          <a:xfrm>
+            <a:off x="0" y="1213285"/>
+            <a:ext cx="4376920" cy="2460816"/>
+          </a:xfrm>
+          <a:prstGeom prst="rect">
+            <a:avLst/>
+          </a:prstGeom>
+        </p:spPr>
+      </p:pic>
+      <p:pic>
+        <p:nvPicPr>
+          <p:cNvPr id="5" name="Picture 4"/>
+          <p:cNvPicPr>
+            <a:picLocks noChangeAspect="1"/>
+          </p:cNvPicPr>
+          <p:nvPr/>
+        </p:nvPicPr>
+        <p:blipFill>
+          <a:blip r:embed="rId2">
+            <a:extLst>
+              <a:ext uri="{28A0092B-C50C-407E-A947-70E740481C1C}">
+                <a14:useLocalDpi xmlns:a14="http://schemas.microsoft.com/office/drawing/2010/main" val="0"/>
+              </a:ext>
+            </a:extLst>
+          </a:blip>
+          <a:stretch>
+            <a:fillRect/>
+          </a:stretch>
+        </p:blipFill>
+        <p:spPr>
+          <a:xfrm>
+            <a:off x="2050867" y="3189026"/>
+            <a:ext cx="5619669" cy="3159521"/>
+          </a:xfrm>
+          <a:prstGeom prst="rect">
+            <a:avLst/>
+          </a:prstGeom>
+        </p:spPr>
+      </p:pic>
     </p:spTree>
   </p:cSld>
   <p:clrMapOvr>
@@ -13972,123 +14319,125 @@
       </p:grpSpPr>
       <p:sp>
         <p:nvSpPr>
-          <p:cNvPr id="230" name="CustomShape 1"/>
-          <p:cNvSpPr/>
-          <p:nvPr/>
-        </p:nvSpPr>
-        <p:spPr>
-          <a:xfrm>
-            <a:off x="914400" y="2205000"/>
-            <a:ext cx="7862760" cy="1451520"/>
-          </a:xfrm>
-          <a:prstGeom prst="rect">
-            <a:avLst/>
-          </a:prstGeom>
-          <a:noFill/>
-          <a:ln>
-            <a:noFill/>
-          </a:ln>
-        </p:spPr>
-        <p:style>
-          <a:lnRef idx="0">
-            <a:scrgbClr r="0" g="0" b="0"/>
-          </a:lnRef>
-          <a:fillRef idx="0">
-            <a:scrgbClr r="0" g="0" b="0"/>
-          </a:fillRef>
-          <a:effectRef idx="0">
-            <a:scrgbClr r="0" g="0" b="0"/>
-          </a:effectRef>
-          <a:fontRef idx="minor"/>
-        </p:style>
-        <p:txBody>
-          <a:bodyPr lIns="90000" tIns="45000" rIns="90000" bIns="45000"/>
+          <p:cNvPr id="2" name="Title 1"/>
+          <p:cNvSpPr>
+            <a:spLocks noGrp="1"/>
+          </p:cNvSpPr>
+          <p:nvPr>
+            <p:ph type="title"/>
+          </p:nvPr>
+        </p:nvSpPr>
+        <p:spPr/>
+        <p:txBody>
+          <a:bodyPr/>
           <a:lstStyle/>
           <a:p>
             <a:r>
-              <a:rPr lang="en-US" sz="4800" b="1" strike="noStrike" spc="-1">
-                <a:solidFill>
-                  <a:srgbClr val="DDDDDD"/>
-                </a:solidFill>
-                <a:uFill>
-                  <a:solidFill>
-                    <a:srgbClr val="FFFFFF"/>
-                  </a:solidFill>
-                </a:uFill>
-                <a:latin typeface="Arial"/>
-                <a:ea typeface="DejaVu Sans"/>
+              <a:rPr lang="en-US">
+                <a:solidFill>
+                  <a:schemeClr val="bg1"/>
+                </a:solidFill>
               </a:rPr>
-              <a:t>Thanks For Watching !!!!</a:t>
+              <a:t>Thuật toán crawler</a:t>
             </a:r>
-            <a:endParaRPr lang="en-US" sz="1800" b="0" strike="noStrike" spc="-1">
-              <a:solidFill>
-                <a:srgbClr val="DDDDDD"/>
-              </a:solidFill>
-              <a:uFill>
-                <a:solidFill>
-                  <a:srgbClr val="FFFFFF"/>
-                </a:solidFill>
-              </a:uFill>
-              <a:latin typeface="Arial"/>
-            </a:endParaRPr>
+            <a:endParaRPr lang="en-US">
+              <a:solidFill>
+                <a:schemeClr val="bg1"/>
+              </a:solidFill>
+            </a:endParaRPr>
+          </a:p>
+        </p:txBody>
+      </p:sp>
+      <p:sp>
+        <p:nvSpPr>
+          <p:cNvPr id="3" name="Subtitle 2"/>
+          <p:cNvSpPr>
+            <a:spLocks noGrp="1"/>
+          </p:cNvSpPr>
+          <p:nvPr>
+            <p:ph type="subTitle"/>
+          </p:nvPr>
+        </p:nvSpPr>
+        <p:spPr/>
+        <p:txBody>
+          <a:bodyPr/>
+          <a:lstStyle/>
+          <a:p>
+            <a:pPr algn="just"/>
+            <a:endParaRPr lang="en-US"/>
           </a:p>
         </p:txBody>
       </p:sp>
       <p:pic>
         <p:nvPicPr>
-          <p:cNvPr id="231" name="Picture 230"/>
-          <p:cNvPicPr/>
+          <p:cNvPr id="4" name="Picture 3"/>
+          <p:cNvPicPr>
+            <a:picLocks noChangeAspect="1"/>
+          </p:cNvPicPr>
           <p:nvPr/>
         </p:nvPicPr>
         <p:blipFill>
-          <a:blip r:embed="rId2"/>
-          <a:stretch/>
+          <a:blip r:embed="rId2">
+            <a:extLst>
+              <a:ext uri="{28A0092B-C50C-407E-A947-70E740481C1C}">
+                <a14:useLocalDpi xmlns:a14="http://schemas.microsoft.com/office/drawing/2010/main" val="0"/>
+              </a:ext>
+            </a:extLst>
+          </a:blip>
+          <a:stretch>
+            <a:fillRect/>
+          </a:stretch>
         </p:blipFill>
         <p:spPr>
           <a:xfrm>
-            <a:off x="2095920" y="3656520"/>
-            <a:ext cx="4762080" cy="2009520"/>
-          </a:xfrm>
-          <a:prstGeom prst="rect">
-            <a:avLst/>
-          </a:prstGeom>
-          <a:ln>
-            <a:noFill/>
-          </a:ln>
+            <a:off x="457200" y="1418400"/>
+            <a:ext cx="5277393" cy="2696400"/>
+          </a:xfrm>
+          <a:prstGeom prst="rect">
+            <a:avLst/>
+          </a:prstGeom>
+        </p:spPr>
+      </p:pic>
+      <p:pic>
+        <p:nvPicPr>
+          <p:cNvPr id="5" name="Picture 4"/>
+          <p:cNvPicPr>
+            <a:picLocks noChangeAspect="1"/>
+          </p:cNvPicPr>
+          <p:nvPr/>
+        </p:nvPicPr>
+        <p:blipFill>
+          <a:blip r:embed="rId3">
+            <a:extLst>
+              <a:ext uri="{28A0092B-C50C-407E-A947-70E740481C1C}">
+                <a14:useLocalDpi xmlns:a14="http://schemas.microsoft.com/office/drawing/2010/main" val="0"/>
+              </a:ext>
+            </a:extLst>
+          </a:blip>
+          <a:stretch>
+            <a:fillRect/>
+          </a:stretch>
+        </p:blipFill>
+        <p:spPr>
+          <a:xfrm>
+            <a:off x="3239231" y="2563200"/>
+            <a:ext cx="5447209" cy="3011657"/>
+          </a:xfrm>
+          <a:prstGeom prst="rect">
+            <a:avLst/>
+          </a:prstGeom>
         </p:spPr>
       </p:pic>
     </p:spTree>
+    <p:extLst>
+      <p:ext uri="{BB962C8B-B14F-4D97-AF65-F5344CB8AC3E}">
+        <p14:creationId xmlns:p14="http://schemas.microsoft.com/office/powerpoint/2010/main" val="3671947959"/>
+      </p:ext>
+    </p:extLst>
   </p:cSld>
   <p:clrMapOvr>
     <a:masterClrMapping/>
   </p:clrMapOvr>
-  <p:timing>
-    <p:tnLst>
-      <p:par>
-        <p:cTn id="1" dur="indefinite" restart="never" nodeType="tmRoot">
-          <p:childTnLst>
-            <p:seq>
-              <p:cTn id="2" nodeType="mainSeq"/>
-              <p:prevCondLst>
-                <p:cond evt="onPrev" delay="0">
-                  <p:tgtEl>
-                    <p:sldTgt/>
-                  </p:tgtEl>
-                </p:cond>
-              </p:prevCondLst>
-              <p:nextCondLst>
-                <p:cond evt="onNext" delay="0">
-                  <p:tgtEl>
-                    <p:sldTgt/>
-                  </p:tgtEl>
-                </p:cond>
-              </p:nextCondLst>
-            </p:seq>
-          </p:childTnLst>
-        </p:cTn>
-      </p:par>
-    </p:tnLst>
-  </p:timing>
 </p:sld>
 </file>
 

</xml_diff>